<commit_message>
Added slide of conclusions to PPT
</commit_message>
<xml_diff>
--- a/Documents/הגשת פרויקט/Final_exam_Presentation.pptx
+++ b/Documents/הגשת פרויקט/Final_exam_Presentation.pptx
@@ -6,7 +6,7 @@
     <p:sldMasterId id="2147483650" r:id="rId2"/>
   </p:sldMasterIdLst>
   <p:notesMasterIdLst>
-    <p:notesMasterId r:id="rId25"/>
+    <p:notesMasterId r:id="rId26"/>
   </p:notesMasterIdLst>
   <p:sldIdLst>
     <p:sldId id="256" r:id="rId3"/>
@@ -31,6 +31,7 @@
     <p:sldId id="288" r:id="rId22"/>
     <p:sldId id="289" r:id="rId23"/>
     <p:sldId id="278" r:id="rId24"/>
+    <p:sldId id="290" r:id="rId25"/>
   </p:sldIdLst>
   <p:sldSz cx="9144000" cy="6858000" type="screen4x3"/>
   <p:notesSz cx="6858000" cy="9144000"/>
@@ -210,6 +211,7 @@
             <p14:sldId id="288"/>
             <p14:sldId id="289"/>
             <p14:sldId id="278"/>
+            <p14:sldId id="290"/>
           </p14:sldIdLst>
         </p14:section>
       </p14:sectionLst>
@@ -10845,6 +10847,178 @@
               <a:bodyPr/>
               <a:lstStyle/>
               <a:p>
+                <a:pPr lvl="0" algn="r" rtl="1"/>
+                <a:r>
+                  <a:rPr lang="he-IL" dirty="0" smtClean="0"/>
+                  <a:t>מקבול כזה:</a:t>
+                </a:r>
+                <a:endParaRPr lang="en-US" dirty="0" smtClean="0"/>
+              </a:p>
+              <a:p>
+                <a:pPr lvl="1" algn="r" rtl="1"/>
+                <a:r>
+                  <a:rPr lang="he-IL" dirty="0" smtClean="0"/>
+                  <a:t>עדיף לתת לכל תהליכון מספיק עבודה כך שמערכת ההפעלה תשקיע את המשאבים בעבודה עצמה ולא בניהול תהליכונים.</a:t>
+                </a:r>
+                <a:endParaRPr lang="en-US" dirty="0" smtClean="0"/>
+              </a:p>
+              <a:p>
+                <a:pPr lvl="1" algn="r" rtl="1"/>
+                <a:r>
+                  <a:rPr lang="he-IL" dirty="0" smtClean="0"/>
+                  <a:t>מקבול שכזה מונע בעייתיות של תהליכונים שסיימו את עבודתם וממתינים לתהליכונים אחרים. במקבול התהליך – אין שום תלות בין התהליכונים.</a:t>
+                </a:r>
+                <a:endParaRPr lang="en-US" dirty="0" smtClean="0"/>
+              </a:p>
+              <a:p>
+                <a:pPr lvl="1" algn="r" rtl="1"/>
+                <a:r>
+                  <a:rPr lang="he-IL" dirty="0" smtClean="0"/>
+                  <a:t>הרצת כל קריאה על פני תהליכון יחיד עוזרת מבחינת העומס על הזכרון. סטטיסטית – ישנן פחות רקורסיות "עמוקות" באותו הזמן.</a:t>
+                </a:r>
+              </a:p>
+              <a:p>
+                <a:pPr lvl="1" algn="r" rtl="1"/>
+                <a:endParaRPr lang="he-IL" dirty="0" smtClean="0"/>
+              </a:p>
+              <a:p>
+                <a:pPr marL="457200" marR="0" lvl="1" indent="0" algn="r" defTabSz="914400" rtl="1" eaLnBrk="1" fontAlgn="base" latinLnBrk="0" hangingPunct="1">
+                  <a:lnSpc>
+                    <a:spcPct val="100000"/>
+                  </a:lnSpc>
+                  <a:spcBef>
+                    <a:spcPct val="30000"/>
+                  </a:spcBef>
+                  <a:spcAft>
+                    <a:spcPct val="0"/>
+                  </a:spcAft>
+                  <a:buClrTx/>
+                  <a:buSzTx/>
+                  <a:buFontTx/>
+                  <a:buNone/>
+                  <a:tabLst/>
+                  <a:defRPr/>
+                </a:pPr>
+                <a:r>
+                  <a:rPr lang="he-IL" dirty="0" smtClean="0"/>
+                  <a:t>מאידך, נראה שמיון הדגימות, לא עוזר לשפר את זמן הריצה באופן ניכר.</a:t>
+                </a:r>
+              </a:p>
+              <a:p>
+                <a:pPr marL="457200" marR="0" lvl="1" indent="0" algn="r" defTabSz="914400" rtl="1" eaLnBrk="1" fontAlgn="base" latinLnBrk="0" hangingPunct="1">
+                  <a:lnSpc>
+                    <a:spcPct val="100000"/>
+                  </a:lnSpc>
+                  <a:spcBef>
+                    <a:spcPct val="30000"/>
+                  </a:spcBef>
+                  <a:spcAft>
+                    <a:spcPct val="0"/>
+                  </a:spcAft>
+                  <a:buClrTx/>
+                  <a:buSzTx/>
+                  <a:buFontTx/>
+                  <a:buNone/>
+                  <a:tabLst/>
+                  <a:defRPr/>
+                </a:pPr>
+                <a:endParaRPr lang="he-IL" dirty="0" smtClean="0"/>
+              </a:p>
+              <a:p>
+                <a:pPr marL="457200" marR="0" lvl="1" indent="0" algn="r" defTabSz="914400" rtl="1" eaLnBrk="1" fontAlgn="base" latinLnBrk="0" hangingPunct="1">
+                  <a:lnSpc>
+                    <a:spcPct val="100000"/>
+                  </a:lnSpc>
+                  <a:spcBef>
+                    <a:spcPct val="30000"/>
+                  </a:spcBef>
+                  <a:spcAft>
+                    <a:spcPct val="0"/>
+                  </a:spcAft>
+                  <a:buClrTx/>
+                  <a:buSzTx/>
+                  <a:buFontTx/>
+                  <a:buNone/>
+                  <a:tabLst/>
+                  <a:defRPr/>
+                </a:pPr>
+                <a:r>
+                  <a:rPr lang="he-IL" dirty="0" smtClean="0"/>
+                  <a:t>להמשך:</a:t>
+                </a:r>
+              </a:p>
+              <a:p>
+                <a:pPr marL="457200" marR="0" lvl="1" indent="0" algn="r" defTabSz="914400" rtl="1" eaLnBrk="1" fontAlgn="base" latinLnBrk="0" hangingPunct="1">
+                  <a:lnSpc>
+                    <a:spcPct val="100000"/>
+                  </a:lnSpc>
+                  <a:spcBef>
+                    <a:spcPct val="30000"/>
+                  </a:spcBef>
+                  <a:spcAft>
+                    <a:spcPct val="0"/>
+                  </a:spcAft>
+                  <a:buClrTx/>
+                  <a:buSzTx/>
+                  <a:buFontTx/>
+                  <a:buNone/>
+                  <a:tabLst/>
+                  <a:defRPr/>
+                </a:pPr>
+                <a:r>
+                  <a:rPr lang="he-IL" dirty="0" smtClean="0"/>
+                  <a:t>כרטיס מסך</a:t>
+                </a:r>
+              </a:p>
+              <a:p>
+                <a:pPr marL="457200" marR="0" lvl="1" indent="0" algn="r" defTabSz="914400" rtl="1" eaLnBrk="1" fontAlgn="base" latinLnBrk="0" hangingPunct="1">
+                  <a:lnSpc>
+                    <a:spcPct val="100000"/>
+                  </a:lnSpc>
+                  <a:spcBef>
+                    <a:spcPct val="30000"/>
+                  </a:spcBef>
+                  <a:spcAft>
+                    <a:spcPct val="0"/>
+                  </a:spcAft>
+                  <a:buClrTx/>
+                  <a:buSzTx/>
+                  <a:buFontTx/>
+                  <a:buNone/>
+                  <a:tabLst/>
+                  <a:defRPr/>
+                </a:pPr>
+                <a:r>
+                  <a:rPr lang="he-IL" dirty="0" smtClean="0"/>
+                  <a:t>הרקורסיה של האלגוריתם מעמיסה על הזכרון ובעייתית בהעברת המימוש לכרטיס מסך.</a:t>
+                </a:r>
+                <a:endParaRPr lang="en-US" dirty="0" smtClean="0"/>
+              </a:p>
+              <a:p>
+                <a:pPr marL="457200" marR="0" lvl="1" indent="0" algn="r" defTabSz="914400" rtl="1" eaLnBrk="1" fontAlgn="base" latinLnBrk="0" hangingPunct="1">
+                  <a:lnSpc>
+                    <a:spcPct val="100000"/>
+                  </a:lnSpc>
+                  <a:spcBef>
+                    <a:spcPct val="30000"/>
+                  </a:spcBef>
+                  <a:spcAft>
+                    <a:spcPct val="0"/>
+                  </a:spcAft>
+                  <a:buClrTx/>
+                  <a:buSzTx/>
+                  <a:buFontTx/>
+                  <a:buNone/>
+                  <a:tabLst/>
+                  <a:defRPr/>
+                </a:pPr>
+                <a:endParaRPr lang="he-IL" dirty="0" smtClean="0"/>
+              </a:p>
+              <a:p>
+                <a:pPr lvl="1" algn="r" rtl="1"/>
+                <a:endParaRPr lang="en-US" dirty="0" smtClean="0"/>
+              </a:p>
+              <a:p>
                 <a:pPr algn="r"/>
                 <a:endParaRPr lang="he-IL" dirty="0"/>
               </a:p>
@@ -11517,6 +11691,742 @@
               <a:rPr lang="en-US" altLang="he-IL" smtClean="0"/>
               <a:pPr/>
               <a:t>22</a:t>
+            </a:fld>
+            <a:endParaRPr lang="en-US" altLang="he-IL"/>
+          </a:p>
+        </p:txBody>
+      </p:sp>
+    </p:spTree>
+    <p:extLst>
+      <p:ext uri="{BB962C8B-B14F-4D97-AF65-F5344CB8AC3E}">
+        <p14:creationId xmlns:p14="http://schemas.microsoft.com/office/powerpoint/2010/main" val="1335780148"/>
+      </p:ext>
+    </p:extLst>
+  </p:cSld>
+  <p:clrMapOvr>
+    <a:masterClrMapping/>
+  </p:clrMapOvr>
+</p:notes>
+</file>
+
+<file path=ppt/notesSlides/notesSlide23.xml><?xml version="1.0" encoding="utf-8"?>
+<p:notes xmlns:a="http://schemas.openxmlformats.org/drawingml/2006/main" xmlns:r="http://schemas.openxmlformats.org/officeDocument/2006/relationships" xmlns:p="http://schemas.openxmlformats.org/presentationml/2006/main">
+  <p:cSld>
+    <p:spTree>
+      <p:nvGrpSpPr>
+        <p:cNvPr id="1" name=""/>
+        <p:cNvGrpSpPr/>
+        <p:nvPr/>
+      </p:nvGrpSpPr>
+      <p:grpSpPr>
+        <a:xfrm>
+          <a:off x="0" y="0"/>
+          <a:ext cx="0" cy="0"/>
+          <a:chOff x="0" y="0"/>
+          <a:chExt cx="0" cy="0"/>
+        </a:xfrm>
+      </p:grpSpPr>
+      <p:sp>
+        <p:nvSpPr>
+          <p:cNvPr id="2" name="Slide Image Placeholder 1"/>
+          <p:cNvSpPr>
+            <a:spLocks noGrp="1" noRot="1" noChangeAspect="1"/>
+          </p:cNvSpPr>
+          <p:nvPr>
+            <p:ph type="sldImg"/>
+          </p:nvPr>
+        </p:nvSpPr>
+        <p:spPr/>
+      </p:sp>
+      <mc:AlternateContent xmlns:mc="http://schemas.openxmlformats.org/markup-compatibility/2006" xmlns:a14="http://schemas.microsoft.com/office/drawing/2010/main">
+        <mc:Choice Requires="a14">
+          <p:sp>
+            <p:nvSpPr>
+              <p:cNvPr id="3" name="Notes Placeholder 2"/>
+              <p:cNvSpPr>
+                <a:spLocks noGrp="1"/>
+              </p:cNvSpPr>
+              <p:nvPr>
+                <p:ph type="body" idx="1"/>
+              </p:nvPr>
+            </p:nvSpPr>
+            <p:spPr/>
+            <p:txBody>
+              <a:bodyPr/>
+              <a:lstStyle/>
+              <a:p>
+                <a:pPr algn="r"/>
+                <a:endParaRPr lang="he-IL" dirty="0"/>
+              </a:p>
+            </p:txBody>
+          </p:sp>
+        </mc:Choice>
+        <mc:Fallback xmlns="">
+          <p:sp>
+            <p:nvSpPr>
+              <p:cNvPr id="3" name="Notes Placeholder 2"/>
+              <p:cNvSpPr>
+                <a:spLocks noGrp="1"/>
+              </p:cNvSpPr>
+              <p:nvPr>
+                <p:ph type="body" idx="1"/>
+              </p:nvPr>
+            </p:nvSpPr>
+            <p:spPr/>
+            <p:txBody>
+              <a:bodyPr/>
+              <a:lstStyle/>
+              <a:p>
+                <a:pPr algn="r" rtl="1"/>
+                <a:r>
+                  <a:rPr lang="he-IL" sz="1200" kern="1200" dirty="0" smtClean="0">
+                    <a:solidFill>
+                      <a:schemeClr val="tx1"/>
+                    </a:solidFill>
+                    <a:effectLst/>
+                    <a:latin typeface="Arial" pitchFamily="34" charset="0"/>
+                    <a:ea typeface="+mn-ea"/>
+                    <a:cs typeface="+mn-cs"/>
+                  </a:rPr>
+                  <a:t>אם כן, את המידע המגולם ב</a:t>
+                </a:r>
+                <a:r>
+                  <a:rPr lang="en-US" sz="1200" kern="1200" dirty="0">
+                    <a:solidFill>
+                      <a:schemeClr val="tx1"/>
+                    </a:solidFill>
+                    <a:effectLst/>
+                    <a:latin typeface="Arial" pitchFamily="34" charset="0"/>
+                    <a:ea typeface="+mn-ea"/>
+                    <a:cs typeface="+mn-cs"/>
+                  </a:rPr>
+                  <a:t>DNA</a:t>
+                </a:r>
+                <a:r>
+                  <a:rPr lang="he-IL" sz="1200" kern="1200" dirty="0">
+                    <a:solidFill>
+                      <a:schemeClr val="tx1"/>
+                    </a:solidFill>
+                    <a:effectLst/>
+                    <a:latin typeface="Arial" pitchFamily="34" charset="0"/>
+                    <a:ea typeface="+mn-ea"/>
+                    <a:cs typeface="+mn-cs"/>
+                  </a:rPr>
+                  <a:t> ניתן לייצג כמחרוזת של הבסיסים המרכיבים אותו, וכך נתייחס אליו בפרויקט זה (לדוג': </a:t>
+                </a:r>
+                <a:r>
+                  <a:rPr lang="en-US" sz="1200" kern="1200" dirty="0">
+                    <a:solidFill>
+                      <a:schemeClr val="tx1"/>
+                    </a:solidFill>
+                    <a:effectLst/>
+                    <a:latin typeface="Arial" pitchFamily="34" charset="0"/>
+                    <a:ea typeface="+mn-ea"/>
+                    <a:cs typeface="+mn-cs"/>
+                  </a:rPr>
+                  <a:t>TGACCGTCAG</a:t>
+                </a:r>
+                <a:r>
+                  <a:rPr lang="he-IL" sz="1200" kern="1200" dirty="0">
+                    <a:solidFill>
+                      <a:schemeClr val="tx1"/>
+                    </a:solidFill>
+                    <a:effectLst/>
+                    <a:latin typeface="Arial" pitchFamily="34" charset="0"/>
+                    <a:ea typeface="+mn-ea"/>
+                    <a:cs typeface="+mn-cs"/>
+                  </a:rPr>
+                  <a:t>....)</a:t>
+                </a:r>
+                <a:endParaRPr lang="en-US" sz="1200" kern="1200" dirty="0">
+                  <a:solidFill>
+                    <a:schemeClr val="tx1"/>
+                  </a:solidFill>
+                  <a:effectLst/>
+                  <a:latin typeface="Arial" pitchFamily="34" charset="0"/>
+                  <a:ea typeface="+mn-ea"/>
+                  <a:cs typeface="+mn-cs"/>
+                </a:endParaRPr>
+              </a:p>
+              <a:p>
+                <a:pPr algn="r" rtl="1"/>
+                <a:r>
+                  <a:rPr lang="he-IL" sz="1200" kern="1200" dirty="0">
+                    <a:solidFill>
+                      <a:schemeClr val="tx1"/>
+                    </a:solidFill>
+                    <a:effectLst/>
+                    <a:latin typeface="Arial" pitchFamily="34" charset="0"/>
+                    <a:ea typeface="+mn-ea"/>
+                    <a:cs typeface="+mn-cs"/>
+                  </a:rPr>
+                  <a:t> </a:t>
+                </a:r>
+                <a:endParaRPr lang="en-US" sz="1200" kern="1200" dirty="0">
+                  <a:solidFill>
+                    <a:schemeClr val="tx1"/>
+                  </a:solidFill>
+                  <a:effectLst/>
+                  <a:latin typeface="Arial" pitchFamily="34" charset="0"/>
+                  <a:ea typeface="+mn-ea"/>
+                  <a:cs typeface="+mn-cs"/>
+                </a:endParaRPr>
+              </a:p>
+              <a:p>
+                <a:pPr algn="r" rtl="1"/>
+                <a:r>
+                  <a:rPr lang="he-IL" sz="1200" kern="1200" dirty="0">
+                    <a:solidFill>
+                      <a:schemeClr val="tx1"/>
+                    </a:solidFill>
+                    <a:effectLst/>
+                    <a:latin typeface="Arial" pitchFamily="34" charset="0"/>
+                    <a:ea typeface="+mn-ea"/>
+                    <a:cs typeface="+mn-cs"/>
+                  </a:rPr>
+                  <a:t>ה</a:t>
+                </a:r>
+                <a:r>
+                  <a:rPr lang="en-US" sz="1200" kern="1200" dirty="0">
+                    <a:solidFill>
+                      <a:schemeClr val="tx1"/>
+                    </a:solidFill>
+                    <a:effectLst/>
+                    <a:latin typeface="Arial" pitchFamily="34" charset="0"/>
+                    <a:ea typeface="+mn-ea"/>
+                    <a:cs typeface="+mn-cs"/>
+                  </a:rPr>
+                  <a:t>DNA </a:t>
+                </a:r>
+                <a:r>
+                  <a:rPr lang="he-IL" sz="1200" kern="1200" dirty="0">
+                    <a:solidFill>
+                      <a:schemeClr val="tx1"/>
+                    </a:solidFill>
+                    <a:effectLst/>
+                    <a:latin typeface="Arial" pitchFamily="34" charset="0"/>
+                    <a:ea typeface="+mn-ea"/>
+                    <a:cs typeface="+mn-cs"/>
+                  </a:rPr>
+                  <a:t> מורכב מכ</a:t>
+                </a:r>
+                <a:r>
+                  <a:rPr lang="en-US" sz="1200" i="0" kern="1200">
+                    <a:solidFill>
+                      <a:schemeClr val="tx1"/>
+                    </a:solidFill>
+                    <a:effectLst/>
+                    <a:latin typeface="Cambria Math"/>
+                    <a:ea typeface="+mn-ea"/>
+                    <a:cs typeface="+mn-cs"/>
+                  </a:rPr>
+                  <a:t>〖6 𝑋10〗^9</a:t>
+                </a:r>
+                <a:r>
+                  <a:rPr lang="he-IL" sz="1200" kern="1200" dirty="0">
+                    <a:solidFill>
+                      <a:schemeClr val="tx1"/>
+                    </a:solidFill>
+                    <a:effectLst/>
+                    <a:latin typeface="Arial" pitchFamily="34" charset="0"/>
+                    <a:ea typeface="+mn-ea"/>
+                    <a:cs typeface="+mn-cs"/>
+                  </a:rPr>
+                  <a:t> שלבים. במונחים דיגיטלים, המידע הגלום ב</a:t>
+                </a:r>
+                <a:r>
+                  <a:rPr lang="en-US" sz="1200" kern="1200" dirty="0">
+                    <a:solidFill>
+                      <a:schemeClr val="tx1"/>
+                    </a:solidFill>
+                    <a:effectLst/>
+                    <a:latin typeface="Arial" pitchFamily="34" charset="0"/>
+                    <a:ea typeface="+mn-ea"/>
+                    <a:cs typeface="+mn-cs"/>
+                  </a:rPr>
+                  <a:t>DNA </a:t>
+                </a:r>
+                <a:r>
+                  <a:rPr lang="he-IL" sz="1200" kern="1200" dirty="0">
+                    <a:solidFill>
+                      <a:schemeClr val="tx1"/>
+                    </a:solidFill>
+                    <a:effectLst/>
+                    <a:latin typeface="Arial" pitchFamily="34" charset="0"/>
+                    <a:ea typeface="+mn-ea"/>
+                    <a:cs typeface="+mn-cs"/>
+                  </a:rPr>
+                  <a:t> שווה ערך למעט יותר מ</a:t>
+                </a:r>
+                <a:r>
+                  <a:rPr lang="en-US" sz="1200" kern="1200" dirty="0">
+                    <a:solidFill>
+                      <a:schemeClr val="tx1"/>
+                    </a:solidFill>
+                    <a:effectLst/>
+                    <a:latin typeface="Arial" pitchFamily="34" charset="0"/>
+                    <a:ea typeface="+mn-ea"/>
+                    <a:cs typeface="+mn-cs"/>
+                  </a:rPr>
+                  <a:t> 1.6 GB </a:t>
+                </a:r>
+                <a:r>
+                  <a:rPr lang="he-IL" sz="1200" kern="1200" dirty="0">
+                    <a:solidFill>
+                      <a:schemeClr val="tx1"/>
+                    </a:solidFill>
+                    <a:effectLst/>
+                    <a:latin typeface="Arial" pitchFamily="34" charset="0"/>
+                    <a:ea typeface="+mn-ea"/>
+                    <a:cs typeface="+mn-cs"/>
+                  </a:rPr>
+                  <a:t>(או כ2 דיסקים...)</a:t>
+                </a:r>
+                <a:endParaRPr lang="en-US" sz="1200" kern="1200" dirty="0">
+                  <a:solidFill>
+                    <a:schemeClr val="tx1"/>
+                  </a:solidFill>
+                  <a:effectLst/>
+                  <a:latin typeface="Arial" pitchFamily="34" charset="0"/>
+                  <a:ea typeface="+mn-ea"/>
+                  <a:cs typeface="+mn-cs"/>
+                </a:endParaRPr>
+              </a:p>
+              <a:p>
+                <a:pPr algn="r" rtl="1"/>
+                <a:r>
+                  <a:rPr lang="he-IL" sz="1200" kern="1200" dirty="0">
+                    <a:solidFill>
+                      <a:schemeClr val="tx1"/>
+                    </a:solidFill>
+                    <a:effectLst/>
+                    <a:latin typeface="Arial" pitchFamily="34" charset="0"/>
+                    <a:ea typeface="+mn-ea"/>
+                    <a:cs typeface="+mn-cs"/>
+                  </a:rPr>
+                  <a:t> </a:t>
+                </a:r>
+                <a:endParaRPr lang="en-US" sz="1200" kern="1200" dirty="0">
+                  <a:solidFill>
+                    <a:schemeClr val="tx1"/>
+                  </a:solidFill>
+                  <a:effectLst/>
+                  <a:latin typeface="Arial" pitchFamily="34" charset="0"/>
+                  <a:ea typeface="+mn-ea"/>
+                  <a:cs typeface="+mn-cs"/>
+                </a:endParaRPr>
+              </a:p>
+              <a:p>
+                <a:pPr algn="r" rtl="1"/>
+                <a:r>
+                  <a:rPr lang="he-IL" sz="1200" kern="1200" dirty="0">
+                    <a:solidFill>
+                      <a:schemeClr val="tx1"/>
+                    </a:solidFill>
+                    <a:effectLst/>
+                    <a:latin typeface="Arial" pitchFamily="34" charset="0"/>
+                    <a:ea typeface="+mn-ea"/>
+                    <a:cs typeface="+mn-cs"/>
+                  </a:rPr>
+                  <a:t>כמו כן, </a:t>
+                </a:r>
+                <a:r>
+                  <a:rPr lang="en-US" sz="1200" kern="1200" dirty="0">
+                    <a:solidFill>
+                      <a:schemeClr val="tx1"/>
+                    </a:solidFill>
+                    <a:effectLst/>
+                    <a:latin typeface="Arial" pitchFamily="34" charset="0"/>
+                    <a:ea typeface="+mn-ea"/>
+                    <a:cs typeface="+mn-cs"/>
+                  </a:rPr>
+                  <a:t>DNA</a:t>
+                </a:r>
+                <a:r>
+                  <a:rPr lang="he-IL" sz="1200" kern="1200" dirty="0">
+                    <a:solidFill>
+                      <a:schemeClr val="tx1"/>
+                    </a:solidFill>
+                    <a:effectLst/>
+                    <a:latin typeface="Arial" pitchFamily="34" charset="0"/>
+                    <a:ea typeface="+mn-ea"/>
+                    <a:cs typeface="+mn-cs"/>
+                  </a:rPr>
+                  <a:t> יכול לעבור מוטציה, שינוי. רוב המוטציות אינן מזיקות אך אם הן מופיעות במקומות מסוימים על גבי רצף ה</a:t>
+                </a:r>
+                <a:r>
+                  <a:rPr lang="en-US" sz="1200" kern="1200" dirty="0">
+                    <a:solidFill>
+                      <a:schemeClr val="tx1"/>
+                    </a:solidFill>
+                    <a:effectLst/>
+                    <a:latin typeface="Arial" pitchFamily="34" charset="0"/>
+                    <a:ea typeface="+mn-ea"/>
+                    <a:cs typeface="+mn-cs"/>
+                  </a:rPr>
+                  <a:t>DNA</a:t>
+                </a:r>
+                <a:r>
+                  <a:rPr lang="he-IL" sz="1200" kern="1200" dirty="0">
+                    <a:solidFill>
+                      <a:schemeClr val="tx1"/>
+                    </a:solidFill>
+                    <a:effectLst/>
+                    <a:latin typeface="Arial" pitchFamily="34" charset="0"/>
+                    <a:ea typeface="+mn-ea"/>
+                    <a:cs typeface="+mn-cs"/>
+                  </a:rPr>
+                  <a:t> הן יכולות לגרום לבעיות גנטיות וביניהן  לנטיה למחלות גנטיות ובפרט לסרטן. </a:t>
+                </a:r>
+                <a:endParaRPr lang="en-US" sz="1200" kern="1200" dirty="0">
+                  <a:solidFill>
+                    <a:schemeClr val="tx1"/>
+                  </a:solidFill>
+                  <a:effectLst/>
+                  <a:latin typeface="Arial" pitchFamily="34" charset="0"/>
+                  <a:ea typeface="+mn-ea"/>
+                  <a:cs typeface="+mn-cs"/>
+                </a:endParaRPr>
+              </a:p>
+              <a:p>
+                <a:pPr algn="r" rtl="1"/>
+                <a:r>
+                  <a:rPr lang="he-IL" sz="1200" kern="1200" dirty="0">
+                    <a:solidFill>
+                      <a:schemeClr val="tx1"/>
+                    </a:solidFill>
+                    <a:effectLst/>
+                    <a:latin typeface="Arial" pitchFamily="34" charset="0"/>
+                    <a:ea typeface="+mn-ea"/>
+                    <a:cs typeface="+mn-cs"/>
+                  </a:rPr>
+                  <a:t> </a:t>
+                </a:r>
+                <a:endParaRPr lang="en-US" sz="1200" kern="1200" dirty="0">
+                  <a:solidFill>
+                    <a:schemeClr val="tx1"/>
+                  </a:solidFill>
+                  <a:effectLst/>
+                  <a:latin typeface="Arial" pitchFamily="34" charset="0"/>
+                  <a:ea typeface="+mn-ea"/>
+                  <a:cs typeface="+mn-cs"/>
+                </a:endParaRPr>
+              </a:p>
+              <a:p>
+                <a:pPr algn="r" rtl="1"/>
+                <a:r>
+                  <a:rPr lang="he-IL" sz="1200" kern="1200" dirty="0">
+                    <a:solidFill>
+                      <a:schemeClr val="tx1"/>
+                    </a:solidFill>
+                    <a:effectLst/>
+                    <a:latin typeface="Arial" pitchFamily="34" charset="0"/>
+                    <a:ea typeface="+mn-ea"/>
+                    <a:cs typeface="+mn-cs"/>
+                  </a:rPr>
+                  <a:t>כיום כאשר חולה מגיע לאבחון לראות האם הוא חולה בסרטן, תהליך הבדיקה הוא ארוך ומסורבל:</a:t>
+                </a:r>
+                <a:endParaRPr lang="en-US" sz="1200" kern="1200" dirty="0">
+                  <a:solidFill>
+                    <a:schemeClr val="tx1"/>
+                  </a:solidFill>
+                  <a:effectLst/>
+                  <a:latin typeface="Arial" pitchFamily="34" charset="0"/>
+                  <a:ea typeface="+mn-ea"/>
+                  <a:cs typeface="+mn-cs"/>
+                </a:endParaRPr>
+              </a:p>
+              <a:p>
+                <a:pPr lvl="0" algn="r" rtl="1"/>
+                <a:r>
+                  <a:rPr lang="he-IL" sz="1200" kern="1200" dirty="0">
+                    <a:solidFill>
+                      <a:schemeClr val="tx1"/>
+                    </a:solidFill>
+                    <a:effectLst/>
+                    <a:latin typeface="Arial" pitchFamily="34" charset="0"/>
+                    <a:ea typeface="+mn-ea"/>
+                    <a:cs typeface="+mn-cs"/>
+                  </a:rPr>
+                  <a:t>לקיחת דגימת </a:t>
+                </a:r>
+                <a:r>
+                  <a:rPr lang="en-US" sz="1200" kern="1200" dirty="0">
+                    <a:solidFill>
+                      <a:schemeClr val="tx1"/>
+                    </a:solidFill>
+                    <a:effectLst/>
+                    <a:latin typeface="Arial" pitchFamily="34" charset="0"/>
+                    <a:ea typeface="+mn-ea"/>
+                    <a:cs typeface="+mn-cs"/>
+                  </a:rPr>
+                  <a:t>DNA</a:t>
+                </a:r>
+                <a:r>
+                  <a:rPr lang="he-IL" sz="1200" kern="1200" dirty="0">
+                    <a:solidFill>
+                      <a:schemeClr val="tx1"/>
+                    </a:solidFill>
+                    <a:effectLst/>
+                    <a:latin typeface="Arial" pitchFamily="34" charset="0"/>
+                    <a:ea typeface="+mn-ea"/>
+                    <a:cs typeface="+mn-cs"/>
+                  </a:rPr>
+                  <a:t>.</a:t>
+                </a:r>
+                <a:endParaRPr lang="en-US" sz="1200" kern="1200" dirty="0">
+                  <a:solidFill>
+                    <a:schemeClr val="tx1"/>
+                  </a:solidFill>
+                  <a:effectLst/>
+                  <a:latin typeface="Arial" pitchFamily="34" charset="0"/>
+                  <a:ea typeface="+mn-ea"/>
+                  <a:cs typeface="+mn-cs"/>
+                </a:endParaRPr>
+              </a:p>
+              <a:p>
+                <a:pPr lvl="0" algn="r" rtl="1"/>
+                <a:r>
+                  <a:rPr lang="he-IL" sz="1200" kern="1200" dirty="0">
+                    <a:solidFill>
+                      <a:schemeClr val="tx1"/>
+                    </a:solidFill>
+                    <a:effectLst/>
+                    <a:latin typeface="Arial" pitchFamily="34" charset="0"/>
+                    <a:ea typeface="+mn-ea"/>
+                    <a:cs typeface="+mn-cs"/>
+                  </a:rPr>
+                  <a:t>השוואת ה</a:t>
+                </a:r>
+                <a:r>
+                  <a:rPr lang="en-US" sz="1200" kern="1200" dirty="0">
+                    <a:solidFill>
+                      <a:schemeClr val="tx1"/>
+                    </a:solidFill>
+                    <a:effectLst/>
+                    <a:latin typeface="Arial" pitchFamily="34" charset="0"/>
+                    <a:ea typeface="+mn-ea"/>
+                    <a:cs typeface="+mn-cs"/>
+                  </a:rPr>
+                  <a:t>DNA</a:t>
+                </a:r>
+                <a:r>
+                  <a:rPr lang="he-IL" sz="1200" kern="1200" dirty="0">
+                    <a:solidFill>
+                      <a:schemeClr val="tx1"/>
+                    </a:solidFill>
+                    <a:effectLst/>
+                    <a:latin typeface="Arial" pitchFamily="34" charset="0"/>
+                    <a:ea typeface="+mn-ea"/>
+                    <a:cs typeface="+mn-cs"/>
+                  </a:rPr>
+                  <a:t> ל</a:t>
+                </a:r>
+                <a:r>
+                  <a:rPr lang="en-US" sz="1200" kern="1200" dirty="0">
+                    <a:solidFill>
+                      <a:schemeClr val="tx1"/>
+                    </a:solidFill>
+                    <a:effectLst/>
+                    <a:latin typeface="Arial" pitchFamily="34" charset="0"/>
+                    <a:ea typeface="+mn-ea"/>
+                    <a:cs typeface="+mn-cs"/>
+                  </a:rPr>
+                  <a:t>DNA</a:t>
+                </a:r>
+                <a:r>
+                  <a:rPr lang="he-IL" sz="1200" kern="1200" dirty="0">
+                    <a:solidFill>
+                      <a:schemeClr val="tx1"/>
+                    </a:solidFill>
+                    <a:effectLst/>
+                    <a:latin typeface="Arial" pitchFamily="34" charset="0"/>
+                    <a:ea typeface="+mn-ea"/>
+                    <a:cs typeface="+mn-cs"/>
+                  </a:rPr>
+                  <a:t> של אדם בריא.</a:t>
+                </a:r>
+                <a:endParaRPr lang="en-US" sz="1200" kern="1200" dirty="0">
+                  <a:solidFill>
+                    <a:schemeClr val="tx1"/>
+                  </a:solidFill>
+                  <a:effectLst/>
+                  <a:latin typeface="Arial" pitchFamily="34" charset="0"/>
+                  <a:ea typeface="+mn-ea"/>
+                  <a:cs typeface="+mn-cs"/>
+                </a:endParaRPr>
+              </a:p>
+              <a:p>
+                <a:pPr lvl="0" algn="r" rtl="1"/>
+                <a:r>
+                  <a:rPr lang="he-IL" sz="1200" kern="1200" dirty="0">
+                    <a:solidFill>
+                      <a:schemeClr val="tx1"/>
+                    </a:solidFill>
+                    <a:effectLst/>
+                    <a:latin typeface="Arial" pitchFamily="34" charset="0"/>
+                    <a:ea typeface="+mn-ea"/>
+                    <a:cs typeface="+mn-cs"/>
+                  </a:rPr>
+                  <a:t>איתור מוטציות ב</a:t>
+                </a:r>
+                <a:r>
+                  <a:rPr lang="en-US" sz="1200" kern="1200" dirty="0">
+                    <a:solidFill>
+                      <a:schemeClr val="tx1"/>
+                    </a:solidFill>
+                    <a:effectLst/>
+                    <a:latin typeface="Arial" pitchFamily="34" charset="0"/>
+                    <a:ea typeface="+mn-ea"/>
+                    <a:cs typeface="+mn-cs"/>
+                  </a:rPr>
+                  <a:t>DNA</a:t>
+                </a:r>
+                <a:r>
+                  <a:rPr lang="he-IL" sz="1200" kern="1200" dirty="0">
+                    <a:solidFill>
+                      <a:schemeClr val="tx1"/>
+                    </a:solidFill>
+                    <a:effectLst/>
+                    <a:latin typeface="Arial" pitchFamily="34" charset="0"/>
+                    <a:ea typeface="+mn-ea"/>
+                    <a:cs typeface="+mn-cs"/>
+                  </a:rPr>
+                  <a:t>.</a:t>
+                </a:r>
+                <a:endParaRPr lang="en-US" sz="1200" kern="1200" dirty="0">
+                  <a:solidFill>
+                    <a:schemeClr val="tx1"/>
+                  </a:solidFill>
+                  <a:effectLst/>
+                  <a:latin typeface="Arial" pitchFamily="34" charset="0"/>
+                  <a:ea typeface="+mn-ea"/>
+                  <a:cs typeface="+mn-cs"/>
+                </a:endParaRPr>
+              </a:p>
+              <a:p>
+                <a:pPr lvl="0" algn="r" rtl="1"/>
+                <a:r>
+                  <a:rPr lang="he-IL" sz="1200" kern="1200" dirty="0">
+                    <a:solidFill>
+                      <a:schemeClr val="tx1"/>
+                    </a:solidFill>
+                    <a:effectLst/>
+                    <a:latin typeface="Arial" pitchFamily="34" charset="0"/>
+                    <a:ea typeface="+mn-ea"/>
+                    <a:cs typeface="+mn-cs"/>
+                  </a:rPr>
+                  <a:t>חיפוש ידני במאגרי מידע האם המוטציות הן במקום שידוע כגורם לסרטן.</a:t>
+                </a:r>
+                <a:endParaRPr lang="en-US" sz="1200" kern="1200" dirty="0">
+                  <a:solidFill>
+                    <a:schemeClr val="tx1"/>
+                  </a:solidFill>
+                  <a:effectLst/>
+                  <a:latin typeface="Arial" pitchFamily="34" charset="0"/>
+                  <a:ea typeface="+mn-ea"/>
+                  <a:cs typeface="+mn-cs"/>
+                </a:endParaRPr>
+              </a:p>
+              <a:p>
+                <a:pPr lvl="0" algn="r" rtl="1"/>
+                <a:r>
+                  <a:rPr lang="he-IL" sz="1200" kern="1200" dirty="0">
+                    <a:solidFill>
+                      <a:schemeClr val="tx1"/>
+                    </a:solidFill>
+                    <a:effectLst/>
+                    <a:latin typeface="Arial" pitchFamily="34" charset="0"/>
+                    <a:ea typeface="+mn-ea"/>
+                    <a:cs typeface="+mn-cs"/>
+                  </a:rPr>
+                  <a:t>חיפוש ידני האם קיימת תרופה שעוזרת לסוג המסוים של הסרטן הנ"ל.</a:t>
+                </a:r>
+                <a:endParaRPr lang="en-US" sz="1200" kern="1200" dirty="0">
+                  <a:solidFill>
+                    <a:schemeClr val="tx1"/>
+                  </a:solidFill>
+                  <a:effectLst/>
+                  <a:latin typeface="Arial" pitchFamily="34" charset="0"/>
+                  <a:ea typeface="+mn-ea"/>
+                  <a:cs typeface="+mn-cs"/>
+                </a:endParaRPr>
+              </a:p>
+              <a:p>
+                <a:pPr algn="r" rtl="1"/>
+                <a:r>
+                  <a:rPr lang="he-IL" sz="1200" kern="1200" dirty="0">
+                    <a:solidFill>
+                      <a:schemeClr val="tx1"/>
+                    </a:solidFill>
+                    <a:effectLst/>
+                    <a:latin typeface="Arial" pitchFamily="34" charset="0"/>
+                    <a:ea typeface="+mn-ea"/>
+                    <a:cs typeface="+mn-cs"/>
+                  </a:rPr>
+                  <a:t>בין הבעיות בתהליך זה ניתן לציין את תהליך ההשוואה (2) שלוקח זמן ארוך במיוחד. כיום, בתי החולים שוכרים חוות שרתים ע"מ ליעל את החישוב הארוך של השוואה.</a:t>
+                </a:r>
+                <a:endParaRPr lang="en-US" sz="1200" kern="1200" dirty="0">
+                  <a:solidFill>
+                    <a:schemeClr val="tx1"/>
+                  </a:solidFill>
+                  <a:effectLst/>
+                  <a:latin typeface="Arial" pitchFamily="34" charset="0"/>
+                  <a:ea typeface="+mn-ea"/>
+                  <a:cs typeface="+mn-cs"/>
+                </a:endParaRPr>
+              </a:p>
+              <a:p>
+                <a:pPr algn="r" rtl="1"/>
+                <a:r>
+                  <a:rPr lang="he-IL" sz="1200" kern="1200" dirty="0">
+                    <a:solidFill>
+                      <a:schemeClr val="tx1"/>
+                    </a:solidFill>
+                    <a:effectLst/>
+                    <a:latin typeface="Arial" pitchFamily="34" charset="0"/>
+                    <a:ea typeface="+mn-ea"/>
+                    <a:cs typeface="+mn-cs"/>
+                  </a:rPr>
+                  <a:t>עם זאת, גם כיום שלב זה לוקח כיום שלם – פרויקט זה יתמקד בייעול שלב זה.</a:t>
+                </a:r>
+                <a:endParaRPr lang="en-US" sz="1200" kern="1200" dirty="0">
+                  <a:solidFill>
+                    <a:schemeClr val="tx1"/>
+                  </a:solidFill>
+                  <a:effectLst/>
+                  <a:latin typeface="Arial" pitchFamily="34" charset="0"/>
+                  <a:ea typeface="+mn-ea"/>
+                  <a:cs typeface="+mn-cs"/>
+                </a:endParaRPr>
+              </a:p>
+              <a:p>
+                <a:pPr algn="r"/>
+                <a:endParaRPr lang="he-IL" dirty="0"/>
+              </a:p>
+            </p:txBody>
+          </p:sp>
+        </mc:Fallback>
+      </mc:AlternateContent>
+      <p:sp>
+        <p:nvSpPr>
+          <p:cNvPr id="4" name="Slide Number Placeholder 3"/>
+          <p:cNvSpPr>
+            <a:spLocks noGrp="1"/>
+          </p:cNvSpPr>
+          <p:nvPr>
+            <p:ph type="sldNum" sz="quarter" idx="10"/>
+          </p:nvPr>
+        </p:nvSpPr>
+        <p:spPr/>
+        <p:txBody>
+          <a:bodyPr/>
+          <a:lstStyle/>
+          <a:p>
+            <a:fld id="{BB3C0BDA-275C-4F72-B40D-28BA313A146B}" type="slidenum">
+              <a:rPr lang="en-US" altLang="he-IL" smtClean="0"/>
+              <a:pPr/>
+              <a:t>23</a:t>
             </a:fld>
             <a:endParaRPr lang="en-US" altLang="he-IL"/>
           </a:p>
@@ -32169,6 +33079,180 @@
       </p:grpSpPr>
       <p:sp>
         <p:nvSpPr>
+          <p:cNvPr id="3" name="Rectangle 2"/>
+          <p:cNvSpPr/>
+          <p:nvPr/>
+        </p:nvSpPr>
+        <p:spPr>
+          <a:xfrm>
+            <a:off x="226789" y="1196752"/>
+            <a:ext cx="8820472" cy="4524315"/>
+          </a:xfrm>
+          <a:prstGeom prst="rect">
+            <a:avLst/>
+          </a:prstGeom>
+        </p:spPr>
+        <p:txBody>
+          <a:bodyPr wrap="square">
+            <a:spAutoFit/>
+          </a:bodyPr>
+          <a:lstStyle/>
+          <a:p>
+            <a:pPr algn="r" rtl="1"/>
+            <a:endParaRPr lang="en-US" sz="2400" b="1" dirty="0"/>
+          </a:p>
+          <a:p>
+            <a:pPr marL="342900" lvl="0" indent="-342900" algn="r" rtl="1">
+              <a:buFont typeface="+mj-lt"/>
+              <a:buAutoNum type="arabicPeriod"/>
+            </a:pPr>
+            <a:r>
+              <a:rPr lang="he-IL" sz="2400" dirty="0"/>
+              <a:t>אורך הדגימות אינו משפיע על זמן הריצה של האלגוריתם הממוקבל ביחס לאלגוריתם הסדרתי</a:t>
+            </a:r>
+            <a:r>
+              <a:rPr lang="he-IL" sz="2400" dirty="0" smtClean="0"/>
+              <a:t>. </a:t>
+            </a:r>
+          </a:p>
+          <a:p>
+            <a:pPr marL="342900" lvl="0" indent="-342900" algn="r" rtl="1">
+              <a:buFont typeface="+mj-lt"/>
+              <a:buAutoNum type="arabicPeriod"/>
+            </a:pPr>
+            <a:r>
+              <a:rPr lang="he-IL" sz="2400" dirty="0" smtClean="0"/>
+              <a:t>מיון </a:t>
+            </a:r>
+            <a:r>
+              <a:rPr lang="he-IL" sz="2400" dirty="0"/>
+              <a:t>/ אי מיון הדגימות אינו משפיע באופן ניכר על זמן הריצה של האלגוריתם הממוקבל ביחס לאלגוריתם הסדרתי.</a:t>
+            </a:r>
+            <a:endParaRPr lang="en-US" sz="2400" dirty="0"/>
+          </a:p>
+          <a:p>
+            <a:pPr lvl="0" algn="r" rtl="1"/>
+            <a:endParaRPr lang="he-IL" sz="2400" dirty="0" smtClean="0"/>
+          </a:p>
+          <a:p>
+            <a:pPr lvl="0" algn="r" rtl="1"/>
+            <a:r>
+              <a:rPr lang="he-IL" sz="2400" dirty="0" smtClean="0"/>
+              <a:t>התוצאות </a:t>
+            </a:r>
+            <a:r>
+              <a:rPr lang="he-IL" sz="2400" dirty="0"/>
+              <a:t>הטובות ביותר מתקבלות ע"י מקבול התהליך, באופן שבו כל דגימת </a:t>
+            </a:r>
+            <a:r>
+              <a:rPr lang="en-US" sz="2400" dirty="0"/>
+              <a:t>DNA</a:t>
+            </a:r>
+            <a:r>
+              <a:rPr lang="he-IL" sz="2400" dirty="0"/>
+              <a:t> מקבלת תהליכון. </a:t>
+            </a:r>
+            <a:endParaRPr lang="he-IL" sz="2400" dirty="0" smtClean="0"/>
+          </a:p>
+          <a:p>
+            <a:pPr lvl="0" algn="r" rtl="1"/>
+            <a:r>
+              <a:rPr lang="he-IL" sz="2400" dirty="0"/>
+              <a:t> </a:t>
+            </a:r>
+            <a:endParaRPr lang="en-US" sz="2400" dirty="0"/>
+          </a:p>
+          <a:p>
+            <a:pPr algn="r" rtl="1"/>
+            <a:r>
+              <a:rPr lang="he-IL" sz="2400" dirty="0" smtClean="0"/>
+              <a:t>נראה </a:t>
+            </a:r>
+            <a:r>
+              <a:rPr lang="he-IL" sz="2400" dirty="0"/>
+              <a:t>שהאלגוריתם הממוקבל נשאר יציב, מבחינת סדרי הגודל של היעול, גם כאשר מעמיסים עליו </a:t>
+            </a:r>
+            <a:r>
+              <a:rPr lang="he-IL" sz="2400" dirty="0" smtClean="0"/>
+              <a:t>הרבה דגימות וללא תלות באורכן.</a:t>
+            </a:r>
+            <a:endParaRPr lang="en-US" sz="2400" dirty="0"/>
+          </a:p>
+          <a:p>
+            <a:pPr algn="r" rtl="1"/>
+            <a:endParaRPr lang="he-IL" sz="2400" dirty="0"/>
+          </a:p>
+        </p:txBody>
+      </p:sp>
+      <p:sp>
+        <p:nvSpPr>
+          <p:cNvPr id="4" name="Rectangle 3"/>
+          <p:cNvSpPr/>
+          <p:nvPr/>
+        </p:nvSpPr>
+        <p:spPr>
+          <a:xfrm>
+            <a:off x="6084168" y="280050"/>
+            <a:ext cx="2448272" cy="769441"/>
+          </a:xfrm>
+          <a:prstGeom prst="rect">
+            <a:avLst/>
+          </a:prstGeom>
+        </p:spPr>
+        <p:txBody>
+          <a:bodyPr wrap="square">
+            <a:spAutoFit/>
+          </a:bodyPr>
+          <a:lstStyle/>
+          <a:p>
+            <a:pPr algn="r" rtl="1"/>
+            <a:r>
+              <a:rPr lang="he-IL" sz="4400" b="1" dirty="0"/>
+              <a:t>מסקנות</a:t>
+            </a:r>
+            <a:endParaRPr lang="he-IL" sz="2400" dirty="0"/>
+          </a:p>
+        </p:txBody>
+      </p:sp>
+    </p:spTree>
+    <p:extLst>
+      <p:ext uri="{BB962C8B-B14F-4D97-AF65-F5344CB8AC3E}">
+        <p14:creationId xmlns:p14="http://schemas.microsoft.com/office/powerpoint/2010/main" val="2691324810"/>
+      </p:ext>
+    </p:extLst>
+  </p:cSld>
+  <p:clrMapOvr>
+    <a:masterClrMapping/>
+  </p:clrMapOvr>
+  <p:timing>
+    <p:tnLst>
+      <p:par>
+        <p:cTn id="1" dur="indefinite" restart="never" nodeType="tmRoot"/>
+      </p:par>
+    </p:tnLst>
+  </p:timing>
+</p:sld>
+</file>
+
+<file path=ppt/slides/slide23.xml><?xml version="1.0" encoding="utf-8"?>
+<p:sld xmlns:a="http://schemas.openxmlformats.org/drawingml/2006/main" xmlns:r="http://schemas.openxmlformats.org/officeDocument/2006/relationships" xmlns:p="http://schemas.openxmlformats.org/presentationml/2006/main">
+  <p:cSld>
+    <p:spTree>
+      <p:nvGrpSpPr>
+        <p:cNvPr id="1" name=""/>
+        <p:cNvGrpSpPr/>
+        <p:nvPr/>
+      </p:nvGrpSpPr>
+      <p:grpSpPr>
+        <a:xfrm>
+          <a:off x="0" y="0"/>
+          <a:ext cx="0" cy="0"/>
+          <a:chOff x="0" y="0"/>
+          <a:chExt cx="0" cy="0"/>
+        </a:xfrm>
+      </p:grpSpPr>
+      <p:sp>
+        <p:nvSpPr>
           <p:cNvPr id="5" name="Rectangle 2"/>
           <p:cNvSpPr txBox="1">
             <a:spLocks noChangeArrowheads="1"/>
@@ -32474,7 +33558,7 @@
     </p:spTree>
     <p:extLst>
       <p:ext uri="{BB962C8B-B14F-4D97-AF65-F5344CB8AC3E}">
-        <p14:creationId xmlns:p14="http://schemas.microsoft.com/office/powerpoint/2010/main" val="2691324810"/>
+        <p14:creationId xmlns:p14="http://schemas.microsoft.com/office/powerpoint/2010/main" val="428968207"/>
       </p:ext>
     </p:extLst>
   </p:cSld>

</xml_diff>